<commit_message>
Removed affliations from old material
</commit_message>
<xml_diff>
--- a/Presentation.pptx
+++ b/Presentation.pptx
@@ -5,24 +5,23 @@
     <p:sldMasterId id="2147483665" r:id="rId1"/>
   </p:sldMasterIdLst>
   <p:notesMasterIdLst>
-    <p:notesMasterId r:id="rId17"/>
+    <p:notesMasterId r:id="rId16"/>
   </p:notesMasterIdLst>
   <p:sldIdLst>
     <p:sldId id="256" r:id="rId2"/>
-    <p:sldId id="257" r:id="rId3"/>
-    <p:sldId id="259" r:id="rId4"/>
-    <p:sldId id="264" r:id="rId5"/>
-    <p:sldId id="265" r:id="rId6"/>
-    <p:sldId id="266" r:id="rId7"/>
-    <p:sldId id="261" r:id="rId8"/>
-    <p:sldId id="262" r:id="rId9"/>
-    <p:sldId id="263" r:id="rId10"/>
-    <p:sldId id="258" r:id="rId11"/>
-    <p:sldId id="267" r:id="rId12"/>
-    <p:sldId id="268" r:id="rId13"/>
-    <p:sldId id="271" r:id="rId14"/>
-    <p:sldId id="269" r:id="rId15"/>
-    <p:sldId id="270" r:id="rId16"/>
+    <p:sldId id="259" r:id="rId3"/>
+    <p:sldId id="264" r:id="rId4"/>
+    <p:sldId id="265" r:id="rId5"/>
+    <p:sldId id="266" r:id="rId6"/>
+    <p:sldId id="261" r:id="rId7"/>
+    <p:sldId id="262" r:id="rId8"/>
+    <p:sldId id="263" r:id="rId9"/>
+    <p:sldId id="258" r:id="rId10"/>
+    <p:sldId id="267" r:id="rId11"/>
+    <p:sldId id="268" r:id="rId12"/>
+    <p:sldId id="271" r:id="rId13"/>
+    <p:sldId id="269" r:id="rId14"/>
+    <p:sldId id="270" r:id="rId15"/>
   </p:sldIdLst>
   <p:sldSz cx="9144000" cy="6858000" type="screen4x3"/>
   <p:notesSz cx="6858000" cy="9144000"/>
@@ -151,6 +150,22 @@
       </a:defRPr>
     </a:lvl9pPr>
   </p:defaultTextStyle>
+  <p:extLst>
+    <p:ext uri="{EFAFB233-063F-42B5-8137-9DF3F51BA10A}">
+      <p15:sldGuideLst xmlns:p15="http://schemas.microsoft.com/office/powerpoint/2012/main">
+        <p15:guide id="1" orient="horz" pos="2160">
+          <p15:clr>
+            <a:srgbClr val="A4A3A4"/>
+          </p15:clr>
+        </p15:guide>
+        <p15:guide id="2" pos="2880">
+          <p15:clr>
+            <a:srgbClr val="A4A3A4"/>
+          </p15:clr>
+        </p15:guide>
+      </p15:sldGuideLst>
+    </p:ext>
+  </p:extLst>
 </p:presentation>
 </file>
 
@@ -236,7 +251,7 @@
           <a:p>
             <a:fld id="{230F2FC7-440D-472F-8DA2-77B35E4B4624}" type="datetimeFigureOut">
               <a:rPr lang="en-US" smtClean="0"/>
-              <a:t>2/5/2015</a:t>
+              <a:t>1/25/2017</a:t>
             </a:fld>
             <a:endParaRPr lang="en-US"/>
           </a:p>
@@ -642,11 +657,11 @@
           <a:p>
             <a:r>
               <a:rPr lang="en-US" dirty="0" smtClean="0"/>
-              <a:t>Visual description</a:t>
+              <a:t>Moving on to a bigger example</a:t>
             </a:r>
             <a:r>
               <a:rPr lang="en-US" baseline="0" dirty="0" smtClean="0"/>
-              <a:t> of the various pins on the Arduino.</a:t>
+              <a:t> with the servo. You can use the Motor Direction and Motor Off blocks to target a specific servo. This is the first time participant will be hooking up a component themselves so it’s good to overview the electrical connections that are required.</a:t>
             </a:r>
             <a:endParaRPr lang="en-US" dirty="0"/>
           </a:p>
@@ -678,7 +693,7 @@
     </p:spTree>
     <p:extLst>
       <p:ext uri="{BB962C8B-B14F-4D97-AF65-F5344CB8AC3E}">
-        <p14:creationId xmlns:p14="http://schemas.microsoft.com/office/powerpoint/2010/main" val="4100859590"/>
+        <p14:creationId xmlns:p14="http://schemas.microsoft.com/office/powerpoint/2010/main" val="4240381777"/>
       </p:ext>
     </p:extLst>
   </p:cSld>
@@ -734,11 +749,11 @@
           <a:p>
             <a:r>
               <a:rPr lang="en-US" dirty="0" smtClean="0"/>
-              <a:t>Moving on to a bigger example</a:t>
+              <a:t>Have them build this example. It will turn the motor one way for 5 seconds, then reverse</a:t>
             </a:r>
             <a:r>
               <a:rPr lang="en-US" baseline="0" dirty="0" smtClean="0"/>
-              <a:t> with the servo. You can use the Motor Direction and Motor Off blocks to target a specific servo. This is the first time participant will be hooking up a component themselves so it’s good to overview the electrical connections that are required.</a:t>
+              <a:t> direction. They can play with this example to change the delays or have it loop continuously. Let the groups explore as they will.</a:t>
             </a:r>
             <a:endParaRPr lang="en-US" dirty="0"/>
           </a:p>
@@ -770,7 +785,7 @@
     </p:spTree>
     <p:extLst>
       <p:ext uri="{BB962C8B-B14F-4D97-AF65-F5344CB8AC3E}">
-        <p14:creationId xmlns:p14="http://schemas.microsoft.com/office/powerpoint/2010/main" val="4240381777"/>
+        <p14:creationId xmlns:p14="http://schemas.microsoft.com/office/powerpoint/2010/main" val="3161535939"/>
       </p:ext>
     </p:extLst>
   </p:cSld>
@@ -824,15 +839,125 @@
           <a:bodyPr/>
           <a:lstStyle/>
           <a:p>
+            <a:pPr marL="0" marR="0" indent="0" algn="l" defTabSz="914400" rtl="0" eaLnBrk="1" fontAlgn="auto" latinLnBrk="0" hangingPunct="1">
+              <a:lnSpc>
+                <a:spcPct val="100000"/>
+              </a:lnSpc>
+              <a:spcBef>
+                <a:spcPts val="0"/>
+              </a:spcBef>
+              <a:spcAft>
+                <a:spcPts val="0"/>
+              </a:spcAft>
+              <a:buClrTx/>
+              <a:buSzTx/>
+              <a:buFontTx/>
+              <a:buNone/>
+              <a:tabLst/>
+              <a:defRPr/>
+            </a:pPr>
             <a:r>
               <a:rPr lang="en-US" dirty="0" smtClean="0"/>
-              <a:t>Have them build this example. It will turn the motor one way for 5 seconds, then reverse</a:t>
+              <a:t>Use</a:t>
             </a:r>
             <a:r>
               <a:rPr lang="en-US" baseline="0" dirty="0" smtClean="0"/>
-              <a:t> direction. They can play with this example to change the delays or have it loop continuously. Let the groups explore as they will.</a:t>
-            </a:r>
-            <a:endParaRPr lang="en-US" dirty="0"/>
+              <a:t> the analog block to turn on and off the LED attached to pin 5.</a:t>
+            </a:r>
+            <a:endParaRPr lang="en-US" dirty="0" smtClean="0"/>
+          </a:p>
+          <a:p>
+            <a:pPr marL="0" marR="0" indent="0" algn="l" defTabSz="914400" rtl="0" eaLnBrk="1" fontAlgn="auto" latinLnBrk="0" hangingPunct="1">
+              <a:lnSpc>
+                <a:spcPct val="100000"/>
+              </a:lnSpc>
+              <a:spcBef>
+                <a:spcPts val="0"/>
+              </a:spcBef>
+              <a:spcAft>
+                <a:spcPts val="0"/>
+              </a:spcAft>
+              <a:buClrTx/>
+              <a:buSzTx/>
+              <a:buFontTx/>
+              <a:buNone/>
+              <a:tabLst/>
+              <a:defRPr/>
+            </a:pPr>
+            <a:endParaRPr lang="en-US" dirty="0" smtClean="0"/>
+          </a:p>
+          <a:p>
+            <a:pPr marL="0" marR="0" indent="0" algn="l" defTabSz="914400" rtl="0" eaLnBrk="1" fontAlgn="auto" latinLnBrk="0" hangingPunct="1">
+              <a:lnSpc>
+                <a:spcPct val="100000"/>
+              </a:lnSpc>
+              <a:spcBef>
+                <a:spcPts val="0"/>
+              </a:spcBef>
+              <a:spcAft>
+                <a:spcPts val="0"/>
+              </a:spcAft>
+              <a:buClrTx/>
+              <a:buSzTx/>
+              <a:buFontTx/>
+              <a:buNone/>
+              <a:tabLst/>
+              <a:defRPr/>
+            </a:pPr>
+            <a:r>
+              <a:rPr lang="en-US" dirty="0" smtClean="0"/>
+              <a:t>After everyone is comfortable</a:t>
+            </a:r>
+            <a:r>
+              <a:rPr lang="en-US" baseline="0" dirty="0" smtClean="0"/>
+              <a:t> with the servo example, you can move on to the LED. This should already be wired up as the pin connections aren’t obvious. It’s good practice to attach a colored wire to each LED color. For example, the pin that controls the red LED has a red wire. That way the participants can hook it up themselves, but they know red wire means red LED and can remember which analog pin that is. </a:t>
+            </a:r>
+          </a:p>
+          <a:p>
+            <a:pPr marL="0" marR="0" indent="0" algn="l" defTabSz="914400" rtl="0" eaLnBrk="1" fontAlgn="auto" latinLnBrk="0" hangingPunct="1">
+              <a:lnSpc>
+                <a:spcPct val="100000"/>
+              </a:lnSpc>
+              <a:spcBef>
+                <a:spcPts val="0"/>
+              </a:spcBef>
+              <a:spcAft>
+                <a:spcPts val="0"/>
+              </a:spcAft>
+              <a:buClrTx/>
+              <a:buSzTx/>
+              <a:buFontTx/>
+              <a:buNone/>
+              <a:tabLst/>
+              <a:defRPr/>
+            </a:pPr>
+            <a:endParaRPr lang="en-US" baseline="0" dirty="0" smtClean="0"/>
+          </a:p>
+          <a:p>
+            <a:pPr marL="0" marR="0" indent="0" algn="l" defTabSz="914400" rtl="0" eaLnBrk="1" fontAlgn="auto" latinLnBrk="0" hangingPunct="1">
+              <a:lnSpc>
+                <a:spcPct val="100000"/>
+              </a:lnSpc>
+              <a:spcBef>
+                <a:spcPts val="0"/>
+              </a:spcBef>
+              <a:spcAft>
+                <a:spcPts val="0"/>
+              </a:spcAft>
+              <a:buClrTx/>
+              <a:buSzTx/>
+              <a:buFontTx/>
+              <a:buNone/>
+              <a:tabLst/>
+              <a:defRPr/>
+            </a:pPr>
+            <a:r>
+              <a:rPr lang="en-US" baseline="0" dirty="0" smtClean="0"/>
+              <a:t>The example can be augmented with loops or different delay to create different color patterns. Also, there can be other independent blocks controlling the other LEDs. The next slide will show an advanced version of this involving loops and variables.</a:t>
+            </a:r>
+          </a:p>
+          <a:p>
+            <a:endParaRPr lang="en-US" dirty="0" smtClean="0"/>
           </a:p>
         </p:txBody>
       </p:sp>
@@ -862,7 +987,7 @@
     </p:spTree>
     <p:extLst>
       <p:ext uri="{BB962C8B-B14F-4D97-AF65-F5344CB8AC3E}">
-        <p14:creationId xmlns:p14="http://schemas.microsoft.com/office/powerpoint/2010/main" val="3161535939"/>
+        <p14:creationId xmlns:p14="http://schemas.microsoft.com/office/powerpoint/2010/main" val="2711884154"/>
       </p:ext>
     </p:extLst>
   </p:cSld>
@@ -916,125 +1041,10 @@
           <a:bodyPr/>
           <a:lstStyle/>
           <a:p>
-            <a:pPr marL="0" marR="0" indent="0" algn="l" defTabSz="914400" rtl="0" eaLnBrk="1" fontAlgn="auto" latinLnBrk="0" hangingPunct="1">
-              <a:lnSpc>
-                <a:spcPct val="100000"/>
-              </a:lnSpc>
-              <a:spcBef>
-                <a:spcPts val="0"/>
-              </a:spcBef>
-              <a:spcAft>
-                <a:spcPts val="0"/>
-              </a:spcAft>
-              <a:buClrTx/>
-              <a:buSzTx/>
-              <a:buFontTx/>
-              <a:buNone/>
-              <a:tabLst/>
-              <a:defRPr/>
-            </a:pPr>
-            <a:r>
-              <a:rPr lang="en-US" dirty="0" smtClean="0"/>
-              <a:t>Use</a:t>
-            </a:r>
             <a:r>
               <a:rPr lang="en-US" baseline="0" dirty="0" smtClean="0"/>
-              <a:t> the analog block to turn on and off the LED attached to pin 5.</a:t>
-            </a:r>
-            <a:endParaRPr lang="en-US" dirty="0" smtClean="0"/>
-          </a:p>
-          <a:p>
-            <a:pPr marL="0" marR="0" indent="0" algn="l" defTabSz="914400" rtl="0" eaLnBrk="1" fontAlgn="auto" latinLnBrk="0" hangingPunct="1">
-              <a:lnSpc>
-                <a:spcPct val="100000"/>
-              </a:lnSpc>
-              <a:spcBef>
-                <a:spcPts val="0"/>
-              </a:spcBef>
-              <a:spcAft>
-                <a:spcPts val="0"/>
-              </a:spcAft>
-              <a:buClrTx/>
-              <a:buSzTx/>
-              <a:buFontTx/>
-              <a:buNone/>
-              <a:tabLst/>
-              <a:defRPr/>
-            </a:pPr>
-            <a:endParaRPr lang="en-US" dirty="0" smtClean="0"/>
-          </a:p>
-          <a:p>
-            <a:pPr marL="0" marR="0" indent="0" algn="l" defTabSz="914400" rtl="0" eaLnBrk="1" fontAlgn="auto" latinLnBrk="0" hangingPunct="1">
-              <a:lnSpc>
-                <a:spcPct val="100000"/>
-              </a:lnSpc>
-              <a:spcBef>
-                <a:spcPts val="0"/>
-              </a:spcBef>
-              <a:spcAft>
-                <a:spcPts val="0"/>
-              </a:spcAft>
-              <a:buClrTx/>
-              <a:buSzTx/>
-              <a:buFontTx/>
-              <a:buNone/>
-              <a:tabLst/>
-              <a:defRPr/>
-            </a:pPr>
-            <a:r>
-              <a:rPr lang="en-US" dirty="0" smtClean="0"/>
-              <a:t>After everyone is comfortable</a:t>
-            </a:r>
-            <a:r>
-              <a:rPr lang="en-US" baseline="0" dirty="0" smtClean="0"/>
-              <a:t> with the servo example, you can move on to the LED. This should already be wired up as the pin connections aren’t obvious. It’s good practice to attach a colored wire to each LED color. For example, the pin that controls the red LED has a red wire. That way the participants can hook it up themselves, but they know red wire means red LED and can remember which analog pin that is. </a:t>
-            </a:r>
-          </a:p>
-          <a:p>
-            <a:pPr marL="0" marR="0" indent="0" algn="l" defTabSz="914400" rtl="0" eaLnBrk="1" fontAlgn="auto" latinLnBrk="0" hangingPunct="1">
-              <a:lnSpc>
-                <a:spcPct val="100000"/>
-              </a:lnSpc>
-              <a:spcBef>
-                <a:spcPts val="0"/>
-              </a:spcBef>
-              <a:spcAft>
-                <a:spcPts val="0"/>
-              </a:spcAft>
-              <a:buClrTx/>
-              <a:buSzTx/>
-              <a:buFontTx/>
-              <a:buNone/>
-              <a:tabLst/>
-              <a:defRPr/>
-            </a:pPr>
-            <a:endParaRPr lang="en-US" baseline="0" dirty="0" smtClean="0"/>
-          </a:p>
-          <a:p>
-            <a:pPr marL="0" marR="0" indent="0" algn="l" defTabSz="914400" rtl="0" eaLnBrk="1" fontAlgn="auto" latinLnBrk="0" hangingPunct="1">
-              <a:lnSpc>
-                <a:spcPct val="100000"/>
-              </a:lnSpc>
-              <a:spcBef>
-                <a:spcPts val="0"/>
-              </a:spcBef>
-              <a:spcAft>
-                <a:spcPts val="0"/>
-              </a:spcAft>
-              <a:buClrTx/>
-              <a:buSzTx/>
-              <a:buFontTx/>
-              <a:buNone/>
-              <a:tabLst/>
-              <a:defRPr/>
-            </a:pPr>
-            <a:r>
-              <a:rPr lang="en-US" baseline="0" dirty="0" smtClean="0"/>
-              <a:t>The example can be augmented with loops or different delay to create different color patterns. Also, there can be other independent blocks controlling the other LEDs. The next slide will show an advanced version of this involving loops and variables.</a:t>
-            </a:r>
-          </a:p>
-          <a:p>
-            <a:endParaRPr lang="en-US" dirty="0" smtClean="0"/>
+              <a:t>Advanced version of the LED example. You can have the participants build this, without explaining it, and then go line by line to describe what each block does. This serves as a good introduction to variables, loops, and parallelism. This should be the most advanced concepts you need to cover. The analog 0 block at the top of the example is good way to turn off any LEDs with a single command.</a:t>
+            </a:r>
           </a:p>
         </p:txBody>
       </p:sp>
@@ -1064,7 +1074,7 @@
     </p:spTree>
     <p:extLst>
       <p:ext uri="{BB962C8B-B14F-4D97-AF65-F5344CB8AC3E}">
-        <p14:creationId xmlns:p14="http://schemas.microsoft.com/office/powerpoint/2010/main" val="2711884154"/>
+        <p14:creationId xmlns:p14="http://schemas.microsoft.com/office/powerpoint/2010/main" val="3190566008"/>
       </p:ext>
     </p:extLst>
   </p:cSld>
@@ -1119,93 +1129,6 @@
           <a:lstStyle/>
           <a:p>
             <a:r>
-              <a:rPr lang="en-US" baseline="0" dirty="0" smtClean="0"/>
-              <a:t>Advanced version of the LED example. You can have the participants build this, without explaining it, and then go line by line to describe what each block does. This serves as a good introduction to variables, loops, and parallelism. This should be the most advanced concepts you need to cover. The analog 0 block at the top of the example is good way to turn off any LEDs with a single command.</a:t>
-            </a:r>
-          </a:p>
-        </p:txBody>
-      </p:sp>
-      <p:sp>
-        <p:nvSpPr>
-          <p:cNvPr id="4" name="Slide Number Placeholder 3"/>
-          <p:cNvSpPr>
-            <a:spLocks noGrp="1"/>
-          </p:cNvSpPr>
-          <p:nvPr>
-            <p:ph type="sldNum" sz="quarter" idx="10"/>
-          </p:nvPr>
-        </p:nvSpPr>
-        <p:spPr/>
-        <p:txBody>
-          <a:bodyPr/>
-          <a:lstStyle/>
-          <a:p>
-            <a:fld id="{995B538D-AAE7-45C2-A66A-7CAC1FA3C42D}" type="slidenum">
-              <a:rPr lang="en-US" smtClean="0"/>
-              <a:t>14</a:t>
-            </a:fld>
-            <a:endParaRPr lang="en-US"/>
-          </a:p>
-        </p:txBody>
-      </p:sp>
-    </p:spTree>
-    <p:extLst>
-      <p:ext uri="{BB962C8B-B14F-4D97-AF65-F5344CB8AC3E}">
-        <p14:creationId xmlns:p14="http://schemas.microsoft.com/office/powerpoint/2010/main" val="3190566008"/>
-      </p:ext>
-    </p:extLst>
-  </p:cSld>
-  <p:clrMapOvr>
-    <a:masterClrMapping/>
-  </p:clrMapOvr>
-</p:notes>
-</file>
-
-<file path=ppt/notesSlides/notesSlide15.xml><?xml version="1.0" encoding="utf-8"?>
-<p:notes xmlns:a="http://schemas.openxmlformats.org/drawingml/2006/main" xmlns:r="http://schemas.openxmlformats.org/officeDocument/2006/relationships" xmlns:p="http://schemas.openxmlformats.org/presentationml/2006/main">
-  <p:cSld>
-    <p:spTree>
-      <p:nvGrpSpPr>
-        <p:cNvPr id="1" name=""/>
-        <p:cNvGrpSpPr/>
-        <p:nvPr/>
-      </p:nvGrpSpPr>
-      <p:grpSpPr>
-        <a:xfrm>
-          <a:off x="0" y="0"/>
-          <a:ext cx="0" cy="0"/>
-          <a:chOff x="0" y="0"/>
-          <a:chExt cx="0" cy="0"/>
-        </a:xfrm>
-      </p:grpSpPr>
-      <p:sp>
-        <p:nvSpPr>
-          <p:cNvPr id="2" name="Slide Image Placeholder 1"/>
-          <p:cNvSpPr>
-            <a:spLocks noGrp="1" noRot="1" noChangeAspect="1"/>
-          </p:cNvSpPr>
-          <p:nvPr>
-            <p:ph type="sldImg"/>
-          </p:nvPr>
-        </p:nvSpPr>
-        <p:spPr/>
-      </p:sp>
-      <p:sp>
-        <p:nvSpPr>
-          <p:cNvPr id="3" name="Notes Placeholder 2"/>
-          <p:cNvSpPr>
-            <a:spLocks noGrp="1"/>
-          </p:cNvSpPr>
-          <p:nvPr>
-            <p:ph type="body" idx="1"/>
-          </p:nvPr>
-        </p:nvSpPr>
-        <p:spPr/>
-        <p:txBody>
-          <a:bodyPr/>
-          <a:lstStyle/>
-          <a:p>
-            <a:r>
               <a:rPr lang="en-US" dirty="0" smtClean="0"/>
               <a:t>This</a:t>
             </a:r>
@@ -1243,7 +1166,7 @@
           <a:p>
             <a:fld id="{995B538D-AAE7-45C2-A66A-7CAC1FA3C42D}" type="slidenum">
               <a:rPr lang="en-US" smtClean="0"/>
-              <a:t>15</a:t>
+              <a:t>14</a:t>
             </a:fld>
             <a:endParaRPr lang="en-US"/>
           </a:p>
@@ -1308,11 +1231,28 @@
           <a:p>
             <a:r>
               <a:rPr lang="en-US" dirty="0" smtClean="0"/>
-              <a:t>Overview existing working in interdisciplinary</a:t>
+              <a:t>General outline of the workshop.</a:t>
             </a:r>
             <a:r>
               <a:rPr lang="en-US" baseline="0" dirty="0" smtClean="0"/>
-              <a:t> design. Show that design and technology need a tight coupling to achieve an effective product.</a:t>
+              <a:t> The key points are to introduce the sensors and hardware that are going to be used, and also to “unload” any terms that might be used. For example, you need to explain the difference between Power (+5V), Ground, Analog, Digital, Circuit…</a:t>
+            </a:r>
+            <a:r>
+              <a:rPr lang="en-US" baseline="0" dirty="0" err="1" smtClean="0"/>
+              <a:t>etc</a:t>
+            </a:r>
+            <a:r>
+              <a:rPr lang="en-US" baseline="0" dirty="0" smtClean="0"/>
+              <a:t>, words that are commonly understood by those familiar with the subject, but are extremely foreign to new learners. To help with this process we’ll describe each sensor as providing some information, such as light, rotation, force, and ignore their more technical names such as photocell, accelerometer, and force sensitive resistor. The same thinking applies to outputs/actuators as well.</a:t>
+            </a:r>
+          </a:p>
+          <a:p>
+            <a:endParaRPr lang="en-US" baseline="0" dirty="0" smtClean="0"/>
+          </a:p>
+          <a:p>
+            <a:r>
+              <a:rPr lang="en-US" baseline="0" dirty="0" smtClean="0"/>
+              <a:t>Overall the workshop is an introduction of these terms, the sensors, a walkthrough of several examples, and then free time. In our experience, 4-5 examples is the perfect amount to get everyone comfortable and working.</a:t>
             </a:r>
             <a:endParaRPr lang="en-US" dirty="0"/>
           </a:p>
@@ -1344,7 +1284,7 @@
     </p:spTree>
     <p:extLst>
       <p:ext uri="{BB962C8B-B14F-4D97-AF65-F5344CB8AC3E}">
-        <p14:creationId xmlns:p14="http://schemas.microsoft.com/office/powerpoint/2010/main" val="115791640"/>
+        <p14:creationId xmlns:p14="http://schemas.microsoft.com/office/powerpoint/2010/main" val="2355909274"/>
       </p:ext>
     </p:extLst>
   </p:cSld>
@@ -1400,28 +1340,11 @@
           <a:p>
             <a:r>
               <a:rPr lang="en-US" dirty="0" smtClean="0"/>
-              <a:t>General outline of the workshop.</a:t>
+              <a:t>All the sensors and actuators that we will be using today. Try to describe them in terms</a:t>
             </a:r>
             <a:r>
               <a:rPr lang="en-US" baseline="0" dirty="0" smtClean="0"/>
-              <a:t> The key points are to introduce the sensors and hardware that are going to be used, and also to “unload” any terms that might be used. For example, you need to explain the difference between Power (+5V), Ground, Analog, Digital, Circuit…</a:t>
-            </a:r>
-            <a:r>
-              <a:rPr lang="en-US" baseline="0" dirty="0" err="1" smtClean="0"/>
-              <a:t>etc</a:t>
-            </a:r>
-            <a:r>
-              <a:rPr lang="en-US" baseline="0" dirty="0" smtClean="0"/>
-              <a:t>, words that are commonly understood by those familiar with the subject, but are extremely foreign to new learners. To help with this process we’ll describe each sensor as providing some information, such as light, rotation, force, and ignore their more technical names such as photocell, accelerometer, and force sensitive resistor. The same thinking applies to outputs/actuators as well.</a:t>
-            </a:r>
-          </a:p>
-          <a:p>
-            <a:endParaRPr lang="en-US" baseline="0" dirty="0" smtClean="0"/>
-          </a:p>
-          <a:p>
-            <a:r>
-              <a:rPr lang="en-US" baseline="0" dirty="0" smtClean="0"/>
-              <a:t>Overall the workshop is an introduction of these terms, the sensors, a walkthrough of several examples, and then free time. In our experience, 4-5 examples is the perfect amount to get everyone comfortable and working.</a:t>
+              <a:t> of the information they provide, or the things they can do. For example, an accelerometer can tell you the amount of rotation in the three axis, or it can tell you how hard it’s hit. You don’t need to explain the physics behind it, just tell people what they can sense or do with each object. However, the participants do need to know how each object works so they can understand when things go wrong. For example, the range finder has a wide sensing area that expands away from the device, thus objects in the periphery might be accidently detected. The participants need to understand information such as this to debug problems.</a:t>
             </a:r>
             <a:endParaRPr lang="en-US" dirty="0"/>
           </a:p>
@@ -1453,7 +1376,7 @@
     </p:spTree>
     <p:extLst>
       <p:ext uri="{BB962C8B-B14F-4D97-AF65-F5344CB8AC3E}">
-        <p14:creationId xmlns:p14="http://schemas.microsoft.com/office/powerpoint/2010/main" val="2355909274"/>
+        <p14:creationId xmlns:p14="http://schemas.microsoft.com/office/powerpoint/2010/main" val="2250209858"/>
       </p:ext>
     </p:extLst>
   </p:cSld>
@@ -1509,11 +1432,11 @@
           <a:p>
             <a:r>
               <a:rPr lang="en-US" dirty="0" smtClean="0"/>
-              <a:t>All the sensors and actuators that we will be using today. Try to describe them in terms</a:t>
+              <a:t>These are user friendly data</a:t>
             </a:r>
             <a:r>
               <a:rPr lang="en-US" baseline="0" dirty="0" smtClean="0"/>
-              <a:t> of the information they provide, or the things they can do. For example, an accelerometer can tell you the amount of rotation in the three axis, or it can tell you how hard it’s hit. You don’t need to explain the physics behind it, just tell people what they can sense or do with each object. However, the participants do need to know how each object works so they can understand when things go wrong. For example, the range finder has a wide sensing area that expands away from the device, thus objects in the periphery might be accidently detected. The participants need to understand information such as this to debug problems.</a:t>
+              <a:t> sheets that we have constructed for each object. The explain what it does, how it works, and how to hook it up to the Arduino. Additionally there are some example blocks that show how to get started with each object.</a:t>
             </a:r>
             <a:endParaRPr lang="en-US" dirty="0"/>
           </a:p>
@@ -1545,7 +1468,7 @@
     </p:spTree>
     <p:extLst>
       <p:ext uri="{BB962C8B-B14F-4D97-AF65-F5344CB8AC3E}">
-        <p14:creationId xmlns:p14="http://schemas.microsoft.com/office/powerpoint/2010/main" val="2250209858"/>
+        <p14:creationId xmlns:p14="http://schemas.microsoft.com/office/powerpoint/2010/main" val="217834163"/>
       </p:ext>
     </p:extLst>
   </p:cSld>
@@ -1601,11 +1524,11 @@
           <a:p>
             <a:r>
               <a:rPr lang="en-US" dirty="0" smtClean="0"/>
-              <a:t>These are user friendly data</a:t>
+              <a:t>Example for the Accelerometer. Probably</a:t>
             </a:r>
             <a:r>
               <a:rPr lang="en-US" baseline="0" dirty="0" smtClean="0"/>
-              <a:t> sheets that we have constructed for each object. The explain what it does, how it works, and how to hook it up to the Arduino. Additionally there are some example blocks that show how to get started with each object.</a:t>
+              <a:t> could skip this slide.</a:t>
             </a:r>
             <a:endParaRPr lang="en-US" dirty="0"/>
           </a:p>
@@ -1637,7 +1560,7 @@
     </p:spTree>
     <p:extLst>
       <p:ext uri="{BB962C8B-B14F-4D97-AF65-F5344CB8AC3E}">
-        <p14:creationId xmlns:p14="http://schemas.microsoft.com/office/powerpoint/2010/main" val="217834163"/>
+        <p14:creationId xmlns:p14="http://schemas.microsoft.com/office/powerpoint/2010/main" val="2775497494"/>
       </p:ext>
     </p:extLst>
   </p:cSld>
@@ -1693,11 +1616,11 @@
           <a:p>
             <a:r>
               <a:rPr lang="en-US" dirty="0" smtClean="0"/>
-              <a:t>Example for the Accelerometer. Probably</a:t>
+              <a:t>Basic description</a:t>
             </a:r>
             <a:r>
               <a:rPr lang="en-US" baseline="0" dirty="0" smtClean="0"/>
-              <a:t> could skip this slide.</a:t>
+              <a:t> of the Scratch language. It’s easier to learn that others and operates using a “jigsaw puzzle” metaphor. Blocks that work together fit together, and you avoid the syntax errors that plague other languages. There are many groups of blocks, but we’re only concerned with these four here.</a:t>
             </a:r>
             <a:endParaRPr lang="en-US" dirty="0"/>
           </a:p>
@@ -1729,7 +1652,7 @@
     </p:spTree>
     <p:extLst>
       <p:ext uri="{BB962C8B-B14F-4D97-AF65-F5344CB8AC3E}">
-        <p14:creationId xmlns:p14="http://schemas.microsoft.com/office/powerpoint/2010/main" val="2775497494"/>
+        <p14:creationId xmlns:p14="http://schemas.microsoft.com/office/powerpoint/2010/main" val="1955945323"/>
       </p:ext>
     </p:extLst>
   </p:cSld>
@@ -1785,11 +1708,11 @@
           <a:p>
             <a:r>
               <a:rPr lang="en-US" dirty="0" smtClean="0"/>
-              <a:t>Basic description</a:t>
+              <a:t>The most basic example, make the LED on the Arduino</a:t>
             </a:r>
             <a:r>
               <a:rPr lang="en-US" baseline="0" dirty="0" smtClean="0"/>
-              <a:t> of the Scratch language. It’s easier to learn that others and operates using a “jigsaw puzzle” metaphor. Blocks that work together fit together, and you avoid the syntax errors that plague other languages. There are many groups of blocks, but we’re only concerned with these four here.</a:t>
+              <a:t> blink on and off. The participants can just pull down a “Digital On/Off” block and target it at pin 13. Simply clicking the block will execute the command. This example can be built up using delays and loops to make it blink at different rates and can serve as a great introduction to these concepts.</a:t>
             </a:r>
             <a:endParaRPr lang="en-US" dirty="0"/>
           </a:p>
@@ -1821,7 +1744,7 @@
     </p:spTree>
     <p:extLst>
       <p:ext uri="{BB962C8B-B14F-4D97-AF65-F5344CB8AC3E}">
-        <p14:creationId xmlns:p14="http://schemas.microsoft.com/office/powerpoint/2010/main" val="1955945323"/>
+        <p14:creationId xmlns:p14="http://schemas.microsoft.com/office/powerpoint/2010/main" val="3426033097"/>
       </p:ext>
     </p:extLst>
   </p:cSld>
@@ -1877,11 +1800,11 @@
           <a:p>
             <a:r>
               <a:rPr lang="en-US" dirty="0" smtClean="0"/>
-              <a:t>The most basic example, make the LED on the Arduino</a:t>
+              <a:t>Really need to</a:t>
             </a:r>
             <a:r>
               <a:rPr lang="en-US" baseline="0" dirty="0" smtClean="0"/>
-              <a:t> blink on and off. The participants can just pull down a “Digital On/Off” block and target it at pin 13. Simply clicking the block will execute the command. This example can be built up using delays and loops to make it blink at different rates and can serve as a great introduction to these concepts.</a:t>
+              <a:t> explain and unload these terms so the participants can explain how to hook up the parts on there own. The datasheets will say “Connect to Analog Input [0-5]” so they need to know the difference between digital and analog inputs.</a:t>
             </a:r>
             <a:endParaRPr lang="en-US" dirty="0"/>
           </a:p>
@@ -1913,7 +1836,7 @@
     </p:spTree>
     <p:extLst>
       <p:ext uri="{BB962C8B-B14F-4D97-AF65-F5344CB8AC3E}">
-        <p14:creationId xmlns:p14="http://schemas.microsoft.com/office/powerpoint/2010/main" val="3426033097"/>
+        <p14:creationId xmlns:p14="http://schemas.microsoft.com/office/powerpoint/2010/main" val="2604806672"/>
       </p:ext>
     </p:extLst>
   </p:cSld>
@@ -1969,11 +1892,11 @@
           <a:p>
             <a:r>
               <a:rPr lang="en-US" dirty="0" smtClean="0"/>
-              <a:t>Really need to</a:t>
+              <a:t>Visual description</a:t>
             </a:r>
             <a:r>
               <a:rPr lang="en-US" baseline="0" dirty="0" smtClean="0"/>
-              <a:t> explain and unload these terms so the participants can explain how to hook up the parts on there own. The datasheets will say “Connect to Analog Input [0-5]” so they need to know the difference between digital and analog inputs.</a:t>
+              <a:t> of the various pins on the Arduino.</a:t>
             </a:r>
             <a:endParaRPr lang="en-US" dirty="0"/>
           </a:p>
@@ -2005,7 +1928,7 @@
     </p:spTree>
     <p:extLst>
       <p:ext uri="{BB962C8B-B14F-4D97-AF65-F5344CB8AC3E}">
-        <p14:creationId xmlns:p14="http://schemas.microsoft.com/office/powerpoint/2010/main" val="2604806672"/>
+        <p14:creationId xmlns:p14="http://schemas.microsoft.com/office/powerpoint/2010/main" val="4100859590"/>
       </p:ext>
     </p:extLst>
   </p:cSld>
@@ -4992,86 +4915,20 @@
       </p:sp>
       <p:sp>
         <p:nvSpPr>
-          <p:cNvPr id="2051" name="Rectangle 3"/>
-          <p:cNvSpPr>
-            <a:spLocks noGrp="1" noChangeArrowheads="1"/>
+          <p:cNvPr id="2" name="Subtitle 1"/>
+          <p:cNvSpPr>
+            <a:spLocks noGrp="1"/>
           </p:cNvSpPr>
           <p:nvPr>
             <p:ph type="subTitle" idx="1"/>
           </p:nvPr>
         </p:nvSpPr>
-        <p:spPr>
-          <a:xfrm>
-            <a:off x="914400" y="3429000"/>
-            <a:ext cx="7696200" cy="1600200"/>
-          </a:xfrm>
-        </p:spPr>
-        <p:txBody>
-          <a:bodyPr/>
-          <a:lstStyle/>
-          <a:p>
-            <a:pPr algn="just">
-              <a:lnSpc>
-                <a:spcPct val="90000"/>
-              </a:lnSpc>
-            </a:pPr>
-            <a:r>
-              <a:rPr lang="en-US" dirty="0"/>
-              <a:t>Jason </a:t>
-            </a:r>
-            <a:r>
-              <a:rPr lang="en-US" dirty="0" smtClean="0"/>
-              <a:t>Forsyth			Ed Dorsa</a:t>
-            </a:r>
-            <a:endParaRPr lang="en-US" dirty="0"/>
-          </a:p>
-          <a:p>
-            <a:pPr algn="just">
-              <a:lnSpc>
-                <a:spcPct val="90000"/>
-              </a:lnSpc>
-            </a:pPr>
-            <a:r>
-              <a:rPr lang="en-US" sz="2000" dirty="0"/>
-              <a:t>PhD </a:t>
-            </a:r>
-            <a:r>
-              <a:rPr lang="en-US" sz="2000" dirty="0" smtClean="0"/>
-              <a:t>Student				Associate Professor</a:t>
-            </a:r>
-            <a:endParaRPr lang="en-US" sz="2000" dirty="0"/>
-          </a:p>
-          <a:p>
-            <a:pPr algn="just">
-              <a:lnSpc>
-                <a:spcPct val="90000"/>
-              </a:lnSpc>
-            </a:pPr>
-            <a:r>
-              <a:rPr lang="en-US" sz="2000" dirty="0"/>
-              <a:t>ECE </a:t>
-            </a:r>
-            <a:r>
-              <a:rPr lang="en-US" sz="2000" dirty="0" smtClean="0"/>
-              <a:t>Department				Industrial Design</a:t>
-            </a:r>
-            <a:endParaRPr lang="en-US" sz="2000" dirty="0"/>
-          </a:p>
-          <a:p>
-            <a:pPr algn="just">
-              <a:lnSpc>
-                <a:spcPct val="90000"/>
-              </a:lnSpc>
-            </a:pPr>
-            <a:r>
-              <a:rPr lang="en-US" sz="2000" dirty="0"/>
-              <a:t>Virginia </a:t>
-            </a:r>
-            <a:r>
-              <a:rPr lang="en-US" sz="2000" dirty="0" smtClean="0"/>
-              <a:t>Tech				Virginia Tech</a:t>
-            </a:r>
-            <a:endParaRPr lang="en-US" sz="2000" dirty="0"/>
+        <p:spPr/>
+        <p:txBody>
+          <a:bodyPr/>
+          <a:lstStyle/>
+          <a:p>
+            <a:endParaRPr lang="en-US"/>
           </a:p>
         </p:txBody>
       </p:sp>
@@ -5115,320 +4972,6 @@
           <a:chExt cx="0" cy="0"/>
         </a:xfrm>
       </p:grpSpPr>
-      <p:pic>
-        <p:nvPicPr>
-          <p:cNvPr id="52226" name="Picture 2" descr="http://arduino.cc/en/uploads/Main/ArduinoUno_R3_Front.jpg"/>
-          <p:cNvPicPr>
-            <a:picLocks noChangeAspect="1" noChangeArrowheads="1"/>
-          </p:cNvPicPr>
-          <p:nvPr/>
-        </p:nvPicPr>
-        <p:blipFill>
-          <a:blip r:embed="rId3">
-            <a:extLst>
-              <a:ext uri="{28A0092B-C50C-407E-A947-70E740481C1C}">
-                <a14:useLocalDpi xmlns:a14="http://schemas.microsoft.com/office/drawing/2010/main" val="0"/>
-              </a:ext>
-            </a:extLst>
-          </a:blip>
-          <a:srcRect/>
-          <a:stretch>
-            <a:fillRect/>
-          </a:stretch>
-        </p:blipFill>
-        <p:spPr bwMode="auto">
-          <a:xfrm>
-            <a:off x="25758" y="381000"/>
-            <a:ext cx="8820578" cy="6096000"/>
-          </a:xfrm>
-          <a:prstGeom prst="rect">
-            <a:avLst/>
-          </a:prstGeom>
-          <a:noFill/>
-          <a:extLst>
-            <a:ext uri="{909E8E84-426E-40DD-AFC4-6F175D3DCCD1}">
-              <a14:hiddenFill xmlns:a14="http://schemas.microsoft.com/office/drawing/2010/main">
-                <a:solidFill>
-                  <a:srgbClr val="FFFFFF"/>
-                </a:solidFill>
-              </a14:hiddenFill>
-            </a:ext>
-          </a:extLst>
-        </p:spPr>
-      </p:pic>
-      <p:sp>
-        <p:nvSpPr>
-          <p:cNvPr id="6" name="Rounded Rectangle 5"/>
-          <p:cNvSpPr/>
-          <p:nvPr/>
-        </p:nvSpPr>
-        <p:spPr>
-          <a:xfrm>
-            <a:off x="6553200" y="5334000"/>
-            <a:ext cx="1905000" cy="1143000"/>
-          </a:xfrm>
-          <a:prstGeom prst="roundRect">
-            <a:avLst/>
-          </a:prstGeom>
-          <a:noFill/>
-          <a:ln w="63500">
-            <a:solidFill>
-              <a:srgbClr val="FF0000"/>
-            </a:solidFill>
-          </a:ln>
-        </p:spPr>
-        <p:style>
-          <a:lnRef idx="2">
-            <a:schemeClr val="accent1">
-              <a:shade val="50000"/>
-            </a:schemeClr>
-          </a:lnRef>
-          <a:fillRef idx="1">
-            <a:schemeClr val="accent1"/>
-          </a:fillRef>
-          <a:effectRef idx="0">
-            <a:schemeClr val="accent1"/>
-          </a:effectRef>
-          <a:fontRef idx="minor">
-            <a:schemeClr val="lt1"/>
-          </a:fontRef>
-        </p:style>
-        <p:txBody>
-          <a:bodyPr rtlCol="0" anchor="ctr"/>
-          <a:lstStyle/>
-          <a:p>
-            <a:pPr algn="ctr"/>
-            <a:endParaRPr lang="en-US"/>
-          </a:p>
-        </p:txBody>
-      </p:sp>
-      <p:sp>
-        <p:nvSpPr>
-          <p:cNvPr id="8" name="Rounded Rectangle 7"/>
-          <p:cNvSpPr/>
-          <p:nvPr/>
-        </p:nvSpPr>
-        <p:spPr>
-          <a:xfrm>
-            <a:off x="3810000" y="381000"/>
-            <a:ext cx="4800600" cy="1219200"/>
-          </a:xfrm>
-          <a:prstGeom prst="roundRect">
-            <a:avLst/>
-          </a:prstGeom>
-          <a:noFill/>
-          <a:ln w="63500">
-            <a:solidFill>
-              <a:srgbClr val="FF0000"/>
-            </a:solidFill>
-          </a:ln>
-        </p:spPr>
-        <p:style>
-          <a:lnRef idx="2">
-            <a:schemeClr val="accent1">
-              <a:shade val="50000"/>
-            </a:schemeClr>
-          </a:lnRef>
-          <a:fillRef idx="1">
-            <a:schemeClr val="accent1"/>
-          </a:fillRef>
-          <a:effectRef idx="0">
-            <a:schemeClr val="accent1"/>
-          </a:effectRef>
-          <a:fontRef idx="minor">
-            <a:schemeClr val="lt1"/>
-          </a:fontRef>
-        </p:style>
-        <p:txBody>
-          <a:bodyPr rtlCol="0" anchor="ctr"/>
-          <a:lstStyle/>
-          <a:p>
-            <a:pPr algn="ctr"/>
-            <a:endParaRPr lang="en-US"/>
-          </a:p>
-        </p:txBody>
-      </p:sp>
-      <p:sp>
-        <p:nvSpPr>
-          <p:cNvPr id="7" name="TextBox 6"/>
-          <p:cNvSpPr txBox="1"/>
-          <p:nvPr/>
-        </p:nvSpPr>
-        <p:spPr>
-          <a:xfrm>
-            <a:off x="3810000" y="0"/>
-            <a:ext cx="4648200" cy="381000"/>
-          </a:xfrm>
-          <a:prstGeom prst="rect">
-            <a:avLst/>
-          </a:prstGeom>
-          <a:noFill/>
-        </p:spPr>
-        <p:txBody>
-          <a:bodyPr wrap="square" rtlCol="0">
-            <a:spAutoFit/>
-          </a:bodyPr>
-          <a:lstStyle/>
-          <a:p>
-            <a:pPr algn="ctr"/>
-            <a:r>
-              <a:rPr lang="en-US" dirty="0" smtClean="0"/>
-              <a:t>Digital </a:t>
-            </a:r>
-            <a:r>
-              <a:rPr lang="en-US" dirty="0" err="1" smtClean="0"/>
-              <a:t>Input/Output</a:t>
-            </a:r>
-            <a:endParaRPr lang="en-US" dirty="0"/>
-          </a:p>
-        </p:txBody>
-      </p:sp>
-      <p:sp>
-        <p:nvSpPr>
-          <p:cNvPr id="11" name="TextBox 10"/>
-          <p:cNvSpPr txBox="1"/>
-          <p:nvPr/>
-        </p:nvSpPr>
-        <p:spPr>
-          <a:xfrm>
-            <a:off x="5105400" y="6477000"/>
-            <a:ext cx="4648200" cy="381000"/>
-          </a:xfrm>
-          <a:prstGeom prst="rect">
-            <a:avLst/>
-          </a:prstGeom>
-          <a:noFill/>
-        </p:spPr>
-        <p:txBody>
-          <a:bodyPr wrap="square" rtlCol="0">
-            <a:spAutoFit/>
-          </a:bodyPr>
-          <a:lstStyle/>
-          <a:p>
-            <a:pPr algn="ctr"/>
-            <a:r>
-              <a:rPr lang="en-US" dirty="0" smtClean="0"/>
-              <a:t>Analog Input</a:t>
-            </a:r>
-            <a:endParaRPr lang="en-US" dirty="0"/>
-          </a:p>
-        </p:txBody>
-      </p:sp>
-      <p:sp>
-        <p:nvSpPr>
-          <p:cNvPr id="12" name="TextBox 11"/>
-          <p:cNvSpPr txBox="1"/>
-          <p:nvPr/>
-        </p:nvSpPr>
-        <p:spPr>
-          <a:xfrm>
-            <a:off x="2895600" y="6477000"/>
-            <a:ext cx="4648200" cy="381000"/>
-          </a:xfrm>
-          <a:prstGeom prst="rect">
-            <a:avLst/>
-          </a:prstGeom>
-          <a:noFill/>
-        </p:spPr>
-        <p:txBody>
-          <a:bodyPr wrap="square" rtlCol="0">
-            <a:spAutoFit/>
-          </a:bodyPr>
-          <a:lstStyle/>
-          <a:p>
-            <a:pPr algn="ctr"/>
-            <a:r>
-              <a:rPr lang="en-US" dirty="0" smtClean="0"/>
-              <a:t>Power &amp; Ground</a:t>
-            </a:r>
-            <a:endParaRPr lang="en-US" dirty="0"/>
-          </a:p>
-        </p:txBody>
-      </p:sp>
-      <p:sp>
-        <p:nvSpPr>
-          <p:cNvPr id="14" name="Rounded Rectangle 13"/>
-          <p:cNvSpPr/>
-          <p:nvPr/>
-        </p:nvSpPr>
-        <p:spPr>
-          <a:xfrm>
-            <a:off x="3810000" y="5257800"/>
-            <a:ext cx="2667000" cy="1219200"/>
-          </a:xfrm>
-          <a:prstGeom prst="roundRect">
-            <a:avLst/>
-          </a:prstGeom>
-          <a:noFill/>
-          <a:ln w="63500">
-            <a:solidFill>
-              <a:srgbClr val="FF0000"/>
-            </a:solidFill>
-          </a:ln>
-        </p:spPr>
-        <p:style>
-          <a:lnRef idx="2">
-            <a:schemeClr val="accent1">
-              <a:shade val="50000"/>
-            </a:schemeClr>
-          </a:lnRef>
-          <a:fillRef idx="1">
-            <a:schemeClr val="accent1"/>
-          </a:fillRef>
-          <a:effectRef idx="0">
-            <a:schemeClr val="accent1"/>
-          </a:effectRef>
-          <a:fontRef idx="minor">
-            <a:schemeClr val="lt1"/>
-          </a:fontRef>
-        </p:style>
-        <p:txBody>
-          <a:bodyPr rtlCol="0" anchor="ctr"/>
-          <a:lstStyle/>
-          <a:p>
-            <a:pPr algn="ctr"/>
-            <a:endParaRPr lang="en-US"/>
-          </a:p>
-        </p:txBody>
-      </p:sp>
-    </p:spTree>
-    <p:extLst>
-      <p:ext uri="{BB962C8B-B14F-4D97-AF65-F5344CB8AC3E}">
-        <p14:creationId xmlns:p14="http://schemas.microsoft.com/office/powerpoint/2010/main" val="1715971361"/>
-      </p:ext>
-    </p:extLst>
-  </p:cSld>
-  <p:clrMapOvr>
-    <a:masterClrMapping/>
-  </p:clrMapOvr>
-  <mc:AlternateContent xmlns:mc="http://schemas.openxmlformats.org/markup-compatibility/2006" xmlns:p14="http://schemas.microsoft.com/office/powerpoint/2010/main">
-    <mc:Choice Requires="p14">
-      <p:transition spd="slow" p14:dur="2000"/>
-    </mc:Choice>
-    <mc:Fallback xmlns="">
-      <p:transition spd="slow"/>
-    </mc:Fallback>
-  </mc:AlternateContent>
-</p:sld>
-</file>
-
-<file path=ppt/slides/slide11.xml><?xml version="1.0" encoding="utf-8"?>
-<p:sld xmlns:a="http://schemas.openxmlformats.org/drawingml/2006/main" xmlns:r="http://schemas.openxmlformats.org/officeDocument/2006/relationships" xmlns:p="http://schemas.openxmlformats.org/presentationml/2006/main">
-  <p:cSld>
-    <p:spTree>
-      <p:nvGrpSpPr>
-        <p:cNvPr id="1" name=""/>
-        <p:cNvGrpSpPr/>
-        <p:nvPr/>
-      </p:nvGrpSpPr>
-      <p:grpSpPr>
-        <a:xfrm>
-          <a:off x="0" y="0"/>
-          <a:ext cx="0" cy="0"/>
-          <a:chOff x="0" y="0"/>
-          <a:chExt cx="0" cy="0"/>
-        </a:xfrm>
-      </p:grpSpPr>
       <p:sp>
         <p:nvSpPr>
           <p:cNvPr id="2" name="Title 1"/>
@@ -5548,7 +5091,7 @@
 </p:sld>
 </file>
 
-<file path=ppt/slides/slide12.xml><?xml version="1.0" encoding="utf-8"?>
+<file path=ppt/slides/slide11.xml><?xml version="1.0" encoding="utf-8"?>
 <p:sld xmlns:a="http://schemas.openxmlformats.org/drawingml/2006/main" xmlns:r="http://schemas.openxmlformats.org/officeDocument/2006/relationships" xmlns:p="http://schemas.openxmlformats.org/presentationml/2006/main">
   <p:cSld>
     <p:spTree>
@@ -5644,7 +5187,7 @@
 </p:sld>
 </file>
 
-<file path=ppt/slides/slide13.xml><?xml version="1.0" encoding="utf-8"?>
+<file path=ppt/slides/slide12.xml><?xml version="1.0" encoding="utf-8"?>
 <p:sld xmlns:a="http://schemas.openxmlformats.org/drawingml/2006/main" xmlns:r="http://schemas.openxmlformats.org/officeDocument/2006/relationships" xmlns:p="http://schemas.openxmlformats.org/presentationml/2006/main">
   <p:cSld>
     <p:spTree>
@@ -5761,7 +5304,7 @@
 </p:sld>
 </file>
 
-<file path=ppt/slides/slide14.xml><?xml version="1.0" encoding="utf-8"?>
+<file path=ppt/slides/slide13.xml><?xml version="1.0" encoding="utf-8"?>
 <p:sld xmlns:a="http://schemas.openxmlformats.org/drawingml/2006/main" xmlns:r="http://schemas.openxmlformats.org/officeDocument/2006/relationships" xmlns:p="http://schemas.openxmlformats.org/presentationml/2006/main">
   <p:cSld>
     <p:spTree>
@@ -5855,7 +5398,7 @@
 </p:sld>
 </file>
 
-<file path=ppt/slides/slide15.xml><?xml version="1.0" encoding="utf-8"?>
+<file path=ppt/slides/slide14.xml><?xml version="1.0" encoding="utf-8"?>
 <p:sld xmlns:a="http://schemas.openxmlformats.org/drawingml/2006/main" xmlns:r="http://schemas.openxmlformats.org/officeDocument/2006/relationships" xmlns:p="http://schemas.openxmlformats.org/presentationml/2006/main">
   <p:cSld>
     <p:spTree>
@@ -5985,300 +5528,6 @@
           <a:p>
             <a:r>
               <a:rPr lang="en-US" dirty="0" smtClean="0"/>
-              <a:t>Preliminaries: Who Are We?</a:t>
-            </a:r>
-            <a:endParaRPr lang="en-US" dirty="0"/>
-          </a:p>
-        </p:txBody>
-      </p:sp>
-      <p:pic>
-        <p:nvPicPr>
-          <p:cNvPr id="51202" name="Picture 2" descr="Students working on designs in kiva"/>
-          <p:cNvPicPr>
-            <a:picLocks noChangeAspect="1" noChangeArrowheads="1"/>
-          </p:cNvPicPr>
-          <p:nvPr/>
-        </p:nvPicPr>
-        <p:blipFill>
-          <a:blip r:embed="rId3">
-            <a:extLst>
-              <a:ext uri="{28A0092B-C50C-407E-A947-70E740481C1C}">
-                <a14:useLocalDpi xmlns:a14="http://schemas.microsoft.com/office/drawing/2010/main" val="0"/>
-              </a:ext>
-            </a:extLst>
-          </a:blip>
-          <a:srcRect/>
-          <a:stretch>
-            <a:fillRect/>
-          </a:stretch>
-        </p:blipFill>
-        <p:spPr bwMode="auto">
-          <a:xfrm>
-            <a:off x="304800" y="152399"/>
-            <a:ext cx="8229600" cy="2477453"/>
-          </a:xfrm>
-          <a:prstGeom prst="rect">
-            <a:avLst/>
-          </a:prstGeom>
-          <a:noFill/>
-          <a:extLst>
-            <a:ext uri="{909E8E84-426E-40DD-AFC4-6F175D3DCCD1}">
-              <a14:hiddenFill xmlns:a14="http://schemas.microsoft.com/office/drawing/2010/main">
-                <a:solidFill>
-                  <a:srgbClr val="FFFFFF"/>
-                </a:solidFill>
-              </a14:hiddenFill>
-            </a:ext>
-          </a:extLst>
-        </p:spPr>
-      </p:pic>
-      <p:pic>
-        <p:nvPicPr>
-          <p:cNvPr id="51204" name="Picture 4"/>
-          <p:cNvPicPr>
-            <a:picLocks noChangeAspect="1" noChangeArrowheads="1"/>
-          </p:cNvPicPr>
-          <p:nvPr/>
-        </p:nvPicPr>
-        <p:blipFill>
-          <a:blip r:embed="rId4">
-            <a:extLst>
-              <a:ext uri="{28A0092B-C50C-407E-A947-70E740481C1C}">
-                <a14:useLocalDpi xmlns:a14="http://schemas.microsoft.com/office/drawing/2010/main" val="0"/>
-              </a:ext>
-            </a:extLst>
-          </a:blip>
-          <a:srcRect/>
-          <a:stretch>
-            <a:fillRect/>
-          </a:stretch>
-        </p:blipFill>
-        <p:spPr bwMode="auto">
-          <a:xfrm>
-            <a:off x="152400" y="2714591"/>
-            <a:ext cx="3249994" cy="2419350"/>
-          </a:xfrm>
-          <a:prstGeom prst="rect">
-            <a:avLst/>
-          </a:prstGeom>
-          <a:noFill/>
-          <a:ln>
-            <a:noFill/>
-          </a:ln>
-          <a:effectLst/>
-          <a:extLst>
-            <a:ext uri="{909E8E84-426E-40DD-AFC4-6F175D3DCCD1}">
-              <a14:hiddenFill xmlns:a14="http://schemas.microsoft.com/office/drawing/2010/main">
-                <a:solidFill>
-                  <a:schemeClr val="accent1"/>
-                </a:solidFill>
-              </a14:hiddenFill>
-            </a:ext>
-            <a:ext uri="{91240B29-F687-4F45-9708-019B960494DF}">
-              <a14:hiddenLine xmlns:a14="http://schemas.microsoft.com/office/drawing/2010/main" w="9525">
-                <a:solidFill>
-                  <a:schemeClr val="tx1"/>
-                </a:solidFill>
-                <a:miter lim="800000"/>
-                <a:headEnd/>
-                <a:tailEnd/>
-              </a14:hiddenLine>
-            </a:ext>
-            <a:ext uri="{AF507438-7753-43E0-B8FC-AC1667EBCBE1}">
-              <a14:hiddenEffects xmlns:a14="http://schemas.microsoft.com/office/drawing/2010/main">
-                <a:effectLst>
-                  <a:outerShdw dist="35921" dir="2700000" algn="ctr" rotWithShape="0">
-                    <a:schemeClr val="bg2"/>
-                  </a:outerShdw>
-                </a:effectLst>
-              </a14:hiddenEffects>
-            </a:ext>
-          </a:extLst>
-        </p:spPr>
-      </p:pic>
-      <p:pic>
-        <p:nvPicPr>
-          <p:cNvPr id="51207" name="Picture 7"/>
-          <p:cNvPicPr>
-            <a:picLocks noChangeAspect="1" noChangeArrowheads="1"/>
-          </p:cNvPicPr>
-          <p:nvPr/>
-        </p:nvPicPr>
-        <p:blipFill>
-          <a:blip r:embed="rId5">
-            <a:extLst>
-              <a:ext uri="{28A0092B-C50C-407E-A947-70E740481C1C}">
-                <a14:useLocalDpi xmlns:a14="http://schemas.microsoft.com/office/drawing/2010/main" val="0"/>
-              </a:ext>
-            </a:extLst>
-          </a:blip>
-          <a:srcRect/>
-          <a:stretch>
-            <a:fillRect/>
-          </a:stretch>
-        </p:blipFill>
-        <p:spPr bwMode="auto">
-          <a:xfrm>
-            <a:off x="2895600" y="4114800"/>
-            <a:ext cx="3552825" cy="2543175"/>
-          </a:xfrm>
-          <a:prstGeom prst="rect">
-            <a:avLst/>
-          </a:prstGeom>
-          <a:noFill/>
-          <a:ln>
-            <a:noFill/>
-          </a:ln>
-          <a:effectLst/>
-          <a:extLst>
-            <a:ext uri="{909E8E84-426E-40DD-AFC4-6F175D3DCCD1}">
-              <a14:hiddenFill xmlns:a14="http://schemas.microsoft.com/office/drawing/2010/main">
-                <a:solidFill>
-                  <a:schemeClr val="accent1"/>
-                </a:solidFill>
-              </a14:hiddenFill>
-            </a:ext>
-            <a:ext uri="{91240B29-F687-4F45-9708-019B960494DF}">
-              <a14:hiddenLine xmlns:a14="http://schemas.microsoft.com/office/drawing/2010/main" w="9525">
-                <a:solidFill>
-                  <a:schemeClr val="tx1"/>
-                </a:solidFill>
-                <a:miter lim="800000"/>
-                <a:headEnd/>
-                <a:tailEnd/>
-              </a14:hiddenLine>
-            </a:ext>
-            <a:ext uri="{AF507438-7753-43E0-B8FC-AC1667EBCBE1}">
-              <a14:hiddenEffects xmlns:a14="http://schemas.microsoft.com/office/drawing/2010/main">
-                <a:effectLst>
-                  <a:outerShdw dist="35921" dir="2700000" algn="ctr" rotWithShape="0">
-                    <a:schemeClr val="bg2"/>
-                  </a:outerShdw>
-                </a:effectLst>
-              </a14:hiddenEffects>
-            </a:ext>
-          </a:extLst>
-        </p:spPr>
-      </p:pic>
-      <p:pic>
-        <p:nvPicPr>
-          <p:cNvPr id="51205" name="Picture 5"/>
-          <p:cNvPicPr>
-            <a:picLocks noChangeAspect="1" noChangeArrowheads="1"/>
-          </p:cNvPicPr>
-          <p:nvPr/>
-        </p:nvPicPr>
-        <p:blipFill>
-          <a:blip r:embed="rId6">
-            <a:extLst>
-              <a:ext uri="{28A0092B-C50C-407E-A947-70E740481C1C}">
-                <a14:useLocalDpi xmlns:a14="http://schemas.microsoft.com/office/drawing/2010/main" val="0"/>
-              </a:ext>
-            </a:extLst>
-          </a:blip>
-          <a:srcRect/>
-          <a:stretch>
-            <a:fillRect/>
-          </a:stretch>
-        </p:blipFill>
-        <p:spPr bwMode="auto">
-          <a:xfrm>
-            <a:off x="5943600" y="2829964"/>
-            <a:ext cx="3040544" cy="2188604"/>
-          </a:xfrm>
-          <a:prstGeom prst="rect">
-            <a:avLst/>
-          </a:prstGeom>
-          <a:noFill/>
-          <a:ln>
-            <a:noFill/>
-          </a:ln>
-          <a:effectLst/>
-          <a:extLst>
-            <a:ext uri="{909E8E84-426E-40DD-AFC4-6F175D3DCCD1}">
-              <a14:hiddenFill xmlns:a14="http://schemas.microsoft.com/office/drawing/2010/main">
-                <a:solidFill>
-                  <a:schemeClr val="accent1"/>
-                </a:solidFill>
-              </a14:hiddenFill>
-            </a:ext>
-            <a:ext uri="{91240B29-F687-4F45-9708-019B960494DF}">
-              <a14:hiddenLine xmlns:a14="http://schemas.microsoft.com/office/drawing/2010/main" w="9525">
-                <a:solidFill>
-                  <a:schemeClr val="tx1"/>
-                </a:solidFill>
-                <a:miter lim="800000"/>
-                <a:headEnd/>
-                <a:tailEnd/>
-              </a14:hiddenLine>
-            </a:ext>
-            <a:ext uri="{AF507438-7753-43E0-B8FC-AC1667EBCBE1}">
-              <a14:hiddenEffects xmlns:a14="http://schemas.microsoft.com/office/drawing/2010/main">
-                <a:effectLst>
-                  <a:outerShdw dist="35921" dir="2700000" algn="ctr" rotWithShape="0">
-                    <a:schemeClr val="bg2"/>
-                  </a:outerShdw>
-                </a:effectLst>
-              </a14:hiddenEffects>
-            </a:ext>
-          </a:extLst>
-        </p:spPr>
-      </p:pic>
-    </p:spTree>
-    <p:extLst>
-      <p:ext uri="{BB962C8B-B14F-4D97-AF65-F5344CB8AC3E}">
-        <p14:creationId xmlns:p14="http://schemas.microsoft.com/office/powerpoint/2010/main" val="3830860515"/>
-      </p:ext>
-    </p:extLst>
-  </p:cSld>
-  <p:clrMapOvr>
-    <a:masterClrMapping/>
-  </p:clrMapOvr>
-  <mc:AlternateContent xmlns:mc="http://schemas.openxmlformats.org/markup-compatibility/2006" xmlns:p14="http://schemas.microsoft.com/office/powerpoint/2010/main">
-    <mc:Choice Requires="p14">
-      <p:transition spd="slow" p14:dur="2000"/>
-    </mc:Choice>
-    <mc:Fallback xmlns="">
-      <p:transition spd="slow"/>
-    </mc:Fallback>
-  </mc:AlternateContent>
-</p:sld>
-</file>
-
-<file path=ppt/slides/slide3.xml><?xml version="1.0" encoding="utf-8"?>
-<p:sld xmlns:a="http://schemas.openxmlformats.org/drawingml/2006/main" xmlns:r="http://schemas.openxmlformats.org/officeDocument/2006/relationships" xmlns:p="http://schemas.openxmlformats.org/presentationml/2006/main">
-  <p:cSld>
-    <p:spTree>
-      <p:nvGrpSpPr>
-        <p:cNvPr id="1" name=""/>
-        <p:cNvGrpSpPr/>
-        <p:nvPr/>
-      </p:nvGrpSpPr>
-      <p:grpSpPr>
-        <a:xfrm>
-          <a:off x="0" y="0"/>
-          <a:ext cx="0" cy="0"/>
-          <a:chOff x="0" y="0"/>
-          <a:chExt cx="0" cy="0"/>
-        </a:xfrm>
-      </p:grpSpPr>
-      <p:sp>
-        <p:nvSpPr>
-          <p:cNvPr id="2" name="Title 1"/>
-          <p:cNvSpPr>
-            <a:spLocks noGrp="1"/>
-          </p:cNvSpPr>
-          <p:nvPr>
-            <p:ph type="title"/>
-          </p:nvPr>
-        </p:nvSpPr>
-        <p:spPr/>
-        <p:txBody>
-          <a:bodyPr/>
-          <a:lstStyle/>
-          <a:p>
-            <a:r>
-              <a:rPr lang="en-US" dirty="0" smtClean="0"/>
               <a:t>Today</a:t>
             </a:r>
             <a:endParaRPr lang="en-US" dirty="0"/>
@@ -6368,7 +5617,7 @@
 </p:sld>
 </file>
 
-<file path=ppt/slides/slide4.xml><?xml version="1.0" encoding="utf-8"?>
+<file path=ppt/slides/slide3.xml><?xml version="1.0" encoding="utf-8"?>
 <p:sld xmlns:a="http://schemas.openxmlformats.org/drawingml/2006/main" xmlns:r="http://schemas.openxmlformats.org/officeDocument/2006/relationships" xmlns:p="http://schemas.openxmlformats.org/presentationml/2006/main">
   <p:cSld>
     <p:spTree>
@@ -6948,7 +6197,7 @@
 </p:sld>
 </file>
 
-<file path=ppt/slides/slide5.xml><?xml version="1.0" encoding="utf-8"?>
+<file path=ppt/slides/slide4.xml><?xml version="1.0" encoding="utf-8"?>
 <p:sld xmlns:a="http://schemas.openxmlformats.org/drawingml/2006/main" xmlns:r="http://schemas.openxmlformats.org/officeDocument/2006/relationships" xmlns:p="http://schemas.openxmlformats.org/presentationml/2006/main" show="0">
   <p:cSld>
     <p:spTree>
@@ -7046,11 +6295,11 @@
   <p:clrMapOvr>
     <a:masterClrMapping/>
   </p:clrMapOvr>
-  <mc:AlternateContent xmlns:mc="http://schemas.openxmlformats.org/markup-compatibility/2006">
-    <mc:Choice xmlns:p14="http://schemas.microsoft.com/office/powerpoint/2010/main" Requires="p14">
+  <mc:AlternateContent xmlns:mc="http://schemas.openxmlformats.org/markup-compatibility/2006" xmlns:p14="http://schemas.microsoft.com/office/powerpoint/2010/main">
+    <mc:Choice Requires="p14">
       <p:transition spd="slow" p14:dur="2000"/>
     </mc:Choice>
-    <mc:Fallback>
+    <mc:Fallback xmlns="">
       <p:transition spd="slow"/>
     </mc:Fallback>
   </mc:AlternateContent>
@@ -7064,7 +6313,7 @@
 </p:sld>
 </file>
 
-<file path=ppt/slides/slide6.xml><?xml version="1.0" encoding="utf-8"?>
+<file path=ppt/slides/slide5.xml><?xml version="1.0" encoding="utf-8"?>
 <p:sld xmlns:a="http://schemas.openxmlformats.org/drawingml/2006/main" xmlns:r="http://schemas.openxmlformats.org/officeDocument/2006/relationships" xmlns:p="http://schemas.openxmlformats.org/presentationml/2006/main" show="0">
   <p:cSld>
     <p:spTree>
@@ -7157,11 +6406,11 @@
   <p:clrMapOvr>
     <a:masterClrMapping/>
   </p:clrMapOvr>
-  <mc:AlternateContent xmlns:mc="http://schemas.openxmlformats.org/markup-compatibility/2006">
-    <mc:Choice xmlns:p14="http://schemas.microsoft.com/office/powerpoint/2010/main" Requires="p14">
+  <mc:AlternateContent xmlns:mc="http://schemas.openxmlformats.org/markup-compatibility/2006" xmlns:p14="http://schemas.microsoft.com/office/powerpoint/2010/main">
+    <mc:Choice Requires="p14">
       <p:transition spd="slow" p14:dur="2000"/>
     </mc:Choice>
-    <mc:Fallback>
+    <mc:Fallback xmlns="">
       <p:transition spd="slow"/>
     </mc:Fallback>
   </mc:AlternateContent>
@@ -7175,7 +6424,7 @@
 </p:sld>
 </file>
 
-<file path=ppt/slides/slide7.xml><?xml version="1.0" encoding="utf-8"?>
+<file path=ppt/slides/slide6.xml><?xml version="1.0" encoding="utf-8"?>
 <p:sld xmlns:a="http://schemas.openxmlformats.org/drawingml/2006/main" xmlns:r="http://schemas.openxmlformats.org/officeDocument/2006/relationships" xmlns:p="http://schemas.openxmlformats.org/presentationml/2006/main">
   <p:cSld>
     <p:spTree>
@@ -7317,7 +6566,7 @@
 </p:sld>
 </file>
 
-<file path=ppt/slides/slide8.xml><?xml version="1.0" encoding="utf-8"?>
+<file path=ppt/slides/slide7.xml><?xml version="1.0" encoding="utf-8"?>
 <p:sld xmlns:a="http://schemas.openxmlformats.org/drawingml/2006/main" xmlns:r="http://schemas.openxmlformats.org/officeDocument/2006/relationships" xmlns:p="http://schemas.openxmlformats.org/presentationml/2006/main">
   <p:cSld>
     <p:spTree>
@@ -7523,6 +6772,95 @@
 </p:sld>
 </file>
 
+<file path=ppt/slides/slide8.xml><?xml version="1.0" encoding="utf-8"?>
+<p:sld xmlns:a="http://schemas.openxmlformats.org/drawingml/2006/main" xmlns:r="http://schemas.openxmlformats.org/officeDocument/2006/relationships" xmlns:p="http://schemas.openxmlformats.org/presentationml/2006/main">
+  <p:cSld>
+    <p:spTree>
+      <p:nvGrpSpPr>
+        <p:cNvPr id="1" name=""/>
+        <p:cNvGrpSpPr/>
+        <p:nvPr/>
+      </p:nvGrpSpPr>
+      <p:grpSpPr>
+        <a:xfrm>
+          <a:off x="0" y="0"/>
+          <a:ext cx="0" cy="0"/>
+          <a:chOff x="0" y="0"/>
+          <a:chExt cx="0" cy="0"/>
+        </a:xfrm>
+      </p:grpSpPr>
+      <p:sp>
+        <p:nvSpPr>
+          <p:cNvPr id="2" name="Title 1"/>
+          <p:cNvSpPr>
+            <a:spLocks noGrp="1"/>
+          </p:cNvSpPr>
+          <p:nvPr>
+            <p:ph type="title"/>
+          </p:nvPr>
+        </p:nvSpPr>
+        <p:spPr/>
+        <p:txBody>
+          <a:bodyPr/>
+          <a:lstStyle/>
+          <a:p>
+            <a:r>
+              <a:rPr lang="en-US" dirty="0" smtClean="0"/>
+              <a:t>Moving On To Better Things….</a:t>
+            </a:r>
+            <a:endParaRPr lang="en-US" dirty="0"/>
+          </a:p>
+        </p:txBody>
+      </p:sp>
+      <p:sp>
+        <p:nvSpPr>
+          <p:cNvPr id="3" name="Content Placeholder 2"/>
+          <p:cNvSpPr>
+            <a:spLocks noGrp="1"/>
+          </p:cNvSpPr>
+          <p:nvPr>
+            <p:ph idx="1"/>
+          </p:nvPr>
+        </p:nvSpPr>
+        <p:spPr/>
+        <p:txBody>
+          <a:bodyPr/>
+          <a:lstStyle/>
+          <a:p>
+            <a:r>
+              <a:rPr lang="en-US" dirty="0" smtClean="0"/>
+              <a:t>Need to understand our Arduino board</a:t>
+            </a:r>
+          </a:p>
+          <a:p>
+            <a:r>
+              <a:rPr lang="en-US" dirty="0" smtClean="0"/>
+              <a:t>Difference between Input / Output / Analog / Digital</a:t>
+            </a:r>
+            <a:endParaRPr lang="en-US" dirty="0"/>
+          </a:p>
+        </p:txBody>
+      </p:sp>
+    </p:spTree>
+    <p:extLst>
+      <p:ext uri="{BB962C8B-B14F-4D97-AF65-F5344CB8AC3E}">
+        <p14:creationId xmlns:p14="http://schemas.microsoft.com/office/powerpoint/2010/main" val="2909894017"/>
+      </p:ext>
+    </p:extLst>
+  </p:cSld>
+  <p:clrMapOvr>
+    <a:masterClrMapping/>
+  </p:clrMapOvr>
+  <p:timing>
+    <p:tnLst>
+      <p:par>
+        <p:cTn id="1" dur="indefinite" restart="never" nodeType="tmRoot"/>
+      </p:par>
+    </p:tnLst>
+  </p:timing>
+</p:sld>
+</file>
+
 <file path=ppt/slides/slide9.xml><?xml version="1.0" encoding="utf-8"?>
 <p:sld xmlns:a="http://schemas.openxmlformats.org/drawingml/2006/main" xmlns:r="http://schemas.openxmlformats.org/officeDocument/2006/relationships" xmlns:p="http://schemas.openxmlformats.org/presentationml/2006/main">
   <p:cSld>
@@ -7540,24 +6878,169 @@
           <a:chExt cx="0" cy="0"/>
         </a:xfrm>
       </p:grpSpPr>
-      <p:sp>
-        <p:nvSpPr>
-          <p:cNvPr id="2" name="Title 1"/>
-          <p:cNvSpPr>
-            <a:spLocks noGrp="1"/>
-          </p:cNvSpPr>
-          <p:nvPr>
-            <p:ph type="title"/>
-          </p:nvPr>
-        </p:nvSpPr>
-        <p:spPr/>
-        <p:txBody>
-          <a:bodyPr/>
-          <a:lstStyle/>
-          <a:p>
+      <p:pic>
+        <p:nvPicPr>
+          <p:cNvPr id="52226" name="Picture 2" descr="http://arduino.cc/en/uploads/Main/ArduinoUno_R3_Front.jpg"/>
+          <p:cNvPicPr>
+            <a:picLocks noChangeAspect="1" noChangeArrowheads="1"/>
+          </p:cNvPicPr>
+          <p:nvPr/>
+        </p:nvPicPr>
+        <p:blipFill>
+          <a:blip r:embed="rId3">
+            <a:extLst>
+              <a:ext uri="{28A0092B-C50C-407E-A947-70E740481C1C}">
+                <a14:useLocalDpi xmlns:a14="http://schemas.microsoft.com/office/drawing/2010/main" val="0"/>
+              </a:ext>
+            </a:extLst>
+          </a:blip>
+          <a:srcRect/>
+          <a:stretch>
+            <a:fillRect/>
+          </a:stretch>
+        </p:blipFill>
+        <p:spPr bwMode="auto">
+          <a:xfrm>
+            <a:off x="25758" y="381000"/>
+            <a:ext cx="8820578" cy="6096000"/>
+          </a:xfrm>
+          <a:prstGeom prst="rect">
+            <a:avLst/>
+          </a:prstGeom>
+          <a:noFill/>
+          <a:extLst>
+            <a:ext uri="{909E8E84-426E-40DD-AFC4-6F175D3DCCD1}">
+              <a14:hiddenFill xmlns:a14="http://schemas.microsoft.com/office/drawing/2010/main">
+                <a:solidFill>
+                  <a:srgbClr val="FFFFFF"/>
+                </a:solidFill>
+              </a14:hiddenFill>
+            </a:ext>
+          </a:extLst>
+        </p:spPr>
+      </p:pic>
+      <p:sp>
+        <p:nvSpPr>
+          <p:cNvPr id="6" name="Rounded Rectangle 5"/>
+          <p:cNvSpPr/>
+          <p:nvPr/>
+        </p:nvSpPr>
+        <p:spPr>
+          <a:xfrm>
+            <a:off x="6553200" y="5334000"/>
+            <a:ext cx="1905000" cy="1143000"/>
+          </a:xfrm>
+          <a:prstGeom prst="roundRect">
+            <a:avLst/>
+          </a:prstGeom>
+          <a:noFill/>
+          <a:ln w="63500">
+            <a:solidFill>
+              <a:srgbClr val="FF0000"/>
+            </a:solidFill>
+          </a:ln>
+        </p:spPr>
+        <p:style>
+          <a:lnRef idx="2">
+            <a:schemeClr val="accent1">
+              <a:shade val="50000"/>
+            </a:schemeClr>
+          </a:lnRef>
+          <a:fillRef idx="1">
+            <a:schemeClr val="accent1"/>
+          </a:fillRef>
+          <a:effectRef idx="0">
+            <a:schemeClr val="accent1"/>
+          </a:effectRef>
+          <a:fontRef idx="minor">
+            <a:schemeClr val="lt1"/>
+          </a:fontRef>
+        </p:style>
+        <p:txBody>
+          <a:bodyPr rtlCol="0" anchor="ctr"/>
+          <a:lstStyle/>
+          <a:p>
+            <a:pPr algn="ctr"/>
+            <a:endParaRPr lang="en-US"/>
+          </a:p>
+        </p:txBody>
+      </p:sp>
+      <p:sp>
+        <p:nvSpPr>
+          <p:cNvPr id="8" name="Rounded Rectangle 7"/>
+          <p:cNvSpPr/>
+          <p:nvPr/>
+        </p:nvSpPr>
+        <p:spPr>
+          <a:xfrm>
+            <a:off x="3810000" y="381000"/>
+            <a:ext cx="4800600" cy="1219200"/>
+          </a:xfrm>
+          <a:prstGeom prst="roundRect">
+            <a:avLst/>
+          </a:prstGeom>
+          <a:noFill/>
+          <a:ln w="63500">
+            <a:solidFill>
+              <a:srgbClr val="FF0000"/>
+            </a:solidFill>
+          </a:ln>
+        </p:spPr>
+        <p:style>
+          <a:lnRef idx="2">
+            <a:schemeClr val="accent1">
+              <a:shade val="50000"/>
+            </a:schemeClr>
+          </a:lnRef>
+          <a:fillRef idx="1">
+            <a:schemeClr val="accent1"/>
+          </a:fillRef>
+          <a:effectRef idx="0">
+            <a:schemeClr val="accent1"/>
+          </a:effectRef>
+          <a:fontRef idx="minor">
+            <a:schemeClr val="lt1"/>
+          </a:fontRef>
+        </p:style>
+        <p:txBody>
+          <a:bodyPr rtlCol="0" anchor="ctr"/>
+          <a:lstStyle/>
+          <a:p>
+            <a:pPr algn="ctr"/>
+            <a:endParaRPr lang="en-US"/>
+          </a:p>
+        </p:txBody>
+      </p:sp>
+      <p:sp>
+        <p:nvSpPr>
+          <p:cNvPr id="7" name="TextBox 6"/>
+          <p:cNvSpPr txBox="1"/>
+          <p:nvPr/>
+        </p:nvSpPr>
+        <p:spPr>
+          <a:xfrm>
+            <a:off x="3810000" y="0"/>
+            <a:ext cx="4648200" cy="381000"/>
+          </a:xfrm>
+          <a:prstGeom prst="rect">
+            <a:avLst/>
+          </a:prstGeom>
+          <a:noFill/>
+        </p:spPr>
+        <p:txBody>
+          <a:bodyPr wrap="square" rtlCol="0">
+            <a:spAutoFit/>
+          </a:bodyPr>
+          <a:lstStyle/>
+          <a:p>
+            <a:pPr algn="ctr"/>
             <a:r>
               <a:rPr lang="en-US" dirty="0" smtClean="0"/>
-              <a:t>Moving On To Better Things….</a:t>
+              <a:t>Digital </a:t>
+            </a:r>
+            <a:r>
+              <a:rPr lang="en-US" dirty="0" err="1" smtClean="0"/>
+              <a:t>Input/Output</a:t>
             </a:r>
             <a:endParaRPr lang="en-US" dirty="0"/>
           </a:p>
@@ -7565,50 +7048,130 @@
       </p:sp>
       <p:sp>
         <p:nvSpPr>
-          <p:cNvPr id="3" name="Content Placeholder 2"/>
-          <p:cNvSpPr>
-            <a:spLocks noGrp="1"/>
-          </p:cNvSpPr>
-          <p:nvPr>
-            <p:ph idx="1"/>
-          </p:nvPr>
-        </p:nvSpPr>
-        <p:spPr/>
-        <p:txBody>
-          <a:bodyPr/>
-          <a:lstStyle/>
-          <a:p>
+          <p:cNvPr id="11" name="TextBox 10"/>
+          <p:cNvSpPr txBox="1"/>
+          <p:nvPr/>
+        </p:nvSpPr>
+        <p:spPr>
+          <a:xfrm>
+            <a:off x="5105400" y="6477000"/>
+            <a:ext cx="4648200" cy="381000"/>
+          </a:xfrm>
+          <a:prstGeom prst="rect">
+            <a:avLst/>
+          </a:prstGeom>
+          <a:noFill/>
+        </p:spPr>
+        <p:txBody>
+          <a:bodyPr wrap="square" rtlCol="0">
+            <a:spAutoFit/>
+          </a:bodyPr>
+          <a:lstStyle/>
+          <a:p>
+            <a:pPr algn="ctr"/>
             <a:r>
               <a:rPr lang="en-US" dirty="0" smtClean="0"/>
-              <a:t>Need to understand our Arduino board</a:t>
-            </a:r>
-          </a:p>
-          <a:p>
+              <a:t>Analog Input</a:t>
+            </a:r>
+            <a:endParaRPr lang="en-US" dirty="0"/>
+          </a:p>
+        </p:txBody>
+      </p:sp>
+      <p:sp>
+        <p:nvSpPr>
+          <p:cNvPr id="12" name="TextBox 11"/>
+          <p:cNvSpPr txBox="1"/>
+          <p:nvPr/>
+        </p:nvSpPr>
+        <p:spPr>
+          <a:xfrm>
+            <a:off x="2895600" y="6477000"/>
+            <a:ext cx="4648200" cy="381000"/>
+          </a:xfrm>
+          <a:prstGeom prst="rect">
+            <a:avLst/>
+          </a:prstGeom>
+          <a:noFill/>
+        </p:spPr>
+        <p:txBody>
+          <a:bodyPr wrap="square" rtlCol="0">
+            <a:spAutoFit/>
+          </a:bodyPr>
+          <a:lstStyle/>
+          <a:p>
+            <a:pPr algn="ctr"/>
             <a:r>
               <a:rPr lang="en-US" dirty="0" smtClean="0"/>
-              <a:t>Difference between Input / Output / Analog / Digital</a:t>
+              <a:t>Power &amp; Ground</a:t>
             </a:r>
             <a:endParaRPr lang="en-US" dirty="0"/>
+          </a:p>
+        </p:txBody>
+      </p:sp>
+      <p:sp>
+        <p:nvSpPr>
+          <p:cNvPr id="14" name="Rounded Rectangle 13"/>
+          <p:cNvSpPr/>
+          <p:nvPr/>
+        </p:nvSpPr>
+        <p:spPr>
+          <a:xfrm>
+            <a:off x="3810000" y="5257800"/>
+            <a:ext cx="2667000" cy="1219200"/>
+          </a:xfrm>
+          <a:prstGeom prst="roundRect">
+            <a:avLst/>
+          </a:prstGeom>
+          <a:noFill/>
+          <a:ln w="63500">
+            <a:solidFill>
+              <a:srgbClr val="FF0000"/>
+            </a:solidFill>
+          </a:ln>
+        </p:spPr>
+        <p:style>
+          <a:lnRef idx="2">
+            <a:schemeClr val="accent1">
+              <a:shade val="50000"/>
+            </a:schemeClr>
+          </a:lnRef>
+          <a:fillRef idx="1">
+            <a:schemeClr val="accent1"/>
+          </a:fillRef>
+          <a:effectRef idx="0">
+            <a:schemeClr val="accent1"/>
+          </a:effectRef>
+          <a:fontRef idx="minor">
+            <a:schemeClr val="lt1"/>
+          </a:fontRef>
+        </p:style>
+        <p:txBody>
+          <a:bodyPr rtlCol="0" anchor="ctr"/>
+          <a:lstStyle/>
+          <a:p>
+            <a:pPr algn="ctr"/>
+            <a:endParaRPr lang="en-US"/>
           </a:p>
         </p:txBody>
       </p:sp>
     </p:spTree>
     <p:extLst>
       <p:ext uri="{BB962C8B-B14F-4D97-AF65-F5344CB8AC3E}">
-        <p14:creationId xmlns:p14="http://schemas.microsoft.com/office/powerpoint/2010/main" val="2909894017"/>
+        <p14:creationId xmlns:p14="http://schemas.microsoft.com/office/powerpoint/2010/main" val="1715971361"/>
       </p:ext>
     </p:extLst>
   </p:cSld>
   <p:clrMapOvr>
     <a:masterClrMapping/>
   </p:clrMapOvr>
-  <p:timing>
-    <p:tnLst>
-      <p:par>
-        <p:cTn id="1" dur="indefinite" restart="never" nodeType="tmRoot"/>
-      </p:par>
-    </p:tnLst>
-  </p:timing>
+  <mc:AlternateContent xmlns:mc="http://schemas.openxmlformats.org/markup-compatibility/2006" xmlns:p14="http://schemas.microsoft.com/office/powerpoint/2010/main">
+    <mc:Choice Requires="p14">
+      <p:transition spd="slow" p14:dur="2000"/>
+    </mc:Choice>
+    <mc:Fallback xmlns="">
+      <p:transition spd="slow"/>
+    </mc:Fallback>
+  </mc:AlternateContent>
 </p:sld>
 </file>
 

</xml_diff>